<commit_message>
Inclusão de breadcrumb na pagina de consulta de produtos. Inclusão de Referência nos slides (site emporio.com)
</commit_message>
<xml_diff>
--- a/documentacao/Apresentacao_TDM_Wireframes.pptx
+++ b/documentacao/Apresentacao_TDM_Wireframes.pptx
@@ -5,10 +5,10 @@
     <p:sldMasterId id="2147483648" r:id="rId1"/>
   </p:sldMasterIdLst>
   <p:notesMasterIdLst>
-    <p:notesMasterId r:id="rId9"/>
+    <p:notesMasterId r:id="rId10"/>
   </p:notesMasterIdLst>
   <p:handoutMasterIdLst>
-    <p:handoutMasterId r:id="rId10"/>
+    <p:handoutMasterId r:id="rId11"/>
   </p:handoutMasterIdLst>
   <p:sldIdLst>
     <p:sldId id="256" r:id="rId2"/>
@@ -18,6 +18,7 @@
     <p:sldId id="261" r:id="rId6"/>
     <p:sldId id="262" r:id="rId7"/>
     <p:sldId id="263" r:id="rId8"/>
+    <p:sldId id="264" r:id="rId9"/>
   </p:sldIdLst>
   <p:sldSz cx="12192000" cy="6858000"/>
   <p:notesSz cx="6858000" cy="9144000"/>
@@ -217,7 +218,7 @@
           <a:p>
             <a:fld id="{EFE1CC91-3607-47EB-8CDF-952C57A5F589}" type="datetimeFigureOut">
               <a:rPr lang="pt-BR" smtClean="0"/>
-              <a:t>22/09/2017</a:t>
+              <a:t>03/10/2017</a:t>
             </a:fld>
             <a:endParaRPr lang="pt-BR"/>
           </a:p>
@@ -386,7 +387,7 @@
           <a:p>
             <a:fld id="{55BC4A5B-337C-4856-A4DC-42EC0A14DAA4}" type="datetimeFigureOut">
               <a:rPr lang="pt-BR" smtClean="0"/>
-              <a:t>22/09/2017</a:t>
+              <a:t>03/10/2017</a:t>
             </a:fld>
             <a:endParaRPr lang="pt-BR"/>
           </a:p>
@@ -786,7 +787,7 @@
           <a:p>
             <a:fld id="{1CBD3B53-E38B-4ADC-A46C-19FF4B018D22}" type="datetime1">
               <a:rPr lang="pt-BR" smtClean="0"/>
-              <a:t>22/09/2017</a:t>
+              <a:t>03/10/2017</a:t>
             </a:fld>
             <a:endParaRPr lang="pt-BR"/>
           </a:p>
@@ -1008,7 +1009,7 @@
           <a:p>
             <a:fld id="{00E63E84-17AB-4471-BFF9-D655AB74A440}" type="datetime1">
               <a:rPr lang="pt-BR" smtClean="0"/>
-              <a:t>22/09/2017</a:t>
+              <a:t>03/10/2017</a:t>
             </a:fld>
             <a:endParaRPr lang="pt-BR"/>
           </a:p>
@@ -1240,7 +1241,7 @@
           <a:p>
             <a:fld id="{11835524-73AE-4172-9F1D-45CFE0CA9A42}" type="datetime1">
               <a:rPr lang="pt-BR" smtClean="0"/>
-              <a:t>22/09/2017</a:t>
+              <a:t>03/10/2017</a:t>
             </a:fld>
             <a:endParaRPr lang="pt-BR"/>
           </a:p>
@@ -1462,7 +1463,7 @@
           <a:p>
             <a:fld id="{5D3195C2-A8CC-4A79-9294-86D0B98B2FDE}" type="datetime1">
               <a:rPr lang="pt-BR" smtClean="0"/>
-              <a:t>22/09/2017</a:t>
+              <a:t>03/10/2017</a:t>
             </a:fld>
             <a:endParaRPr lang="pt-BR"/>
           </a:p>
@@ -1761,7 +1762,7 @@
           <a:p>
             <a:fld id="{943FABCC-46C6-4689-BE96-0D67287E4987}" type="datetime1">
               <a:rPr lang="pt-BR" smtClean="0"/>
-              <a:t>22/09/2017</a:t>
+              <a:t>03/10/2017</a:t>
             </a:fld>
             <a:endParaRPr lang="pt-BR"/>
           </a:p>
@@ -2044,7 +2045,7 @@
           <a:p>
             <a:fld id="{EA3A1C37-D56D-4A90-B218-62424E6DB662}" type="datetime1">
               <a:rPr lang="pt-BR" smtClean="0"/>
-              <a:t>22/09/2017</a:t>
+              <a:t>03/10/2017</a:t>
             </a:fld>
             <a:endParaRPr lang="pt-BR"/>
           </a:p>
@@ -2462,7 +2463,7 @@
           <a:p>
             <a:fld id="{80DBD02B-B94E-4798-81F1-9203A08B3D4B}" type="datetime1">
               <a:rPr lang="pt-BR" smtClean="0"/>
-              <a:t>22/09/2017</a:t>
+              <a:t>03/10/2017</a:t>
             </a:fld>
             <a:endParaRPr lang="pt-BR"/>
           </a:p>
@@ -2633,7 +2634,7 @@
           <a:p>
             <a:fld id="{47BF2D93-93FD-40AD-BCE1-E73197C2AC8A}" type="datetime1">
               <a:rPr lang="pt-BR" smtClean="0"/>
-              <a:t>22/09/2017</a:t>
+              <a:t>03/10/2017</a:t>
             </a:fld>
             <a:endParaRPr lang="pt-BR"/>
           </a:p>
@@ -2782,7 +2783,7 @@
           <a:p>
             <a:fld id="{66D10A0A-F4E2-4825-AF47-D3F7192C6086}" type="datetime1">
               <a:rPr lang="pt-BR" smtClean="0"/>
-              <a:t>22/09/2017</a:t>
+              <a:t>03/10/2017</a:t>
             </a:fld>
             <a:endParaRPr lang="pt-BR"/>
           </a:p>
@@ -3111,7 +3112,7 @@
           <a:p>
             <a:fld id="{8E3F9304-59EF-4935-81FC-E8E78A216A92}" type="datetime1">
               <a:rPr lang="pt-BR" smtClean="0"/>
-              <a:t>22/09/2017</a:t>
+              <a:t>03/10/2017</a:t>
             </a:fld>
             <a:endParaRPr lang="pt-BR"/>
           </a:p>
@@ -3417,7 +3418,7 @@
           <a:p>
             <a:fld id="{31D8D486-5475-4B83-84FE-9D880FEAD921}" type="datetime1">
               <a:rPr lang="pt-BR" smtClean="0"/>
-              <a:t>22/09/2017</a:t>
+              <a:t>03/10/2017</a:t>
             </a:fld>
             <a:endParaRPr lang="pt-BR"/>
           </a:p>
@@ -3682,7 +3683,7 @@
           <a:p>
             <a:fld id="{53B1DCB8-1A01-4040-8086-567E78D13ECF}" type="datetime1">
               <a:rPr lang="pt-BR" smtClean="0"/>
-              <a:t>22/09/2017</a:t>
+              <a:t>03/10/2017</a:t>
             </a:fld>
             <a:endParaRPr lang="pt-BR" dirty="0"/>
           </a:p>
@@ -5151,6 +5152,83 @@
     <p:extLst>
       <p:ext uri="{BB962C8B-B14F-4D97-AF65-F5344CB8AC3E}">
         <p14:creationId xmlns:p14="http://schemas.microsoft.com/office/powerpoint/2010/main" val="1473786864"/>
+      </p:ext>
+    </p:extLst>
+  </p:cSld>
+  <p:clrMapOvr>
+    <a:masterClrMapping/>
+  </p:clrMapOvr>
+</p:sld>
+</file>
+
+<file path=ppt/slides/slide8.xml><?xml version="1.0" encoding="utf-8"?>
+<p:sld xmlns:a="http://schemas.openxmlformats.org/drawingml/2006/main" xmlns:r="http://schemas.openxmlformats.org/officeDocument/2006/relationships" xmlns:p="http://schemas.openxmlformats.org/presentationml/2006/main">
+  <p:cSld>
+    <p:spTree>
+      <p:nvGrpSpPr>
+        <p:cNvPr id="1" name=""/>
+        <p:cNvGrpSpPr/>
+        <p:nvPr/>
+      </p:nvGrpSpPr>
+      <p:grpSpPr>
+        <a:xfrm>
+          <a:off x="0" y="0"/>
+          <a:ext cx="0" cy="0"/>
+          <a:chOff x="0" y="0"/>
+          <a:chExt cx="0" cy="0"/>
+        </a:xfrm>
+      </p:grpSpPr>
+      <p:sp>
+        <p:nvSpPr>
+          <p:cNvPr id="2" name="Título 1"/>
+          <p:cNvSpPr>
+            <a:spLocks noGrp="1"/>
+          </p:cNvSpPr>
+          <p:nvPr>
+            <p:ph type="title"/>
+          </p:nvPr>
+        </p:nvSpPr>
+        <p:spPr/>
+        <p:txBody>
+          <a:bodyPr/>
+          <a:lstStyle/>
+          <a:p>
+            <a:pPr algn="ctr"/>
+            <a:r>
+              <a:rPr lang="pt-BR" i="1" dirty="0"/>
+              <a:t>Referências</a:t>
+            </a:r>
+          </a:p>
+        </p:txBody>
+      </p:sp>
+      <p:pic>
+        <p:nvPicPr>
+          <p:cNvPr id="5" name="Imagem 4"/>
+          <p:cNvPicPr>
+            <a:picLocks noChangeAspect="1"/>
+          </p:cNvPicPr>
+          <p:nvPr/>
+        </p:nvPicPr>
+        <p:blipFill>
+          <a:blip r:embed="rId2"/>
+          <a:stretch>
+            <a:fillRect/>
+          </a:stretch>
+        </p:blipFill>
+        <p:spPr>
+          <a:xfrm>
+            <a:off x="1173410" y="1547327"/>
+            <a:ext cx="9581026" cy="4642711"/>
+          </a:xfrm>
+          <a:prstGeom prst="rect">
+            <a:avLst/>
+          </a:prstGeom>
+        </p:spPr>
+      </p:pic>
+    </p:spTree>
+    <p:extLst>
+      <p:ext uri="{BB962C8B-B14F-4D97-AF65-F5344CB8AC3E}">
+        <p14:creationId xmlns:p14="http://schemas.microsoft.com/office/powerpoint/2010/main" val="3490334375"/>
       </p:ext>
     </p:extLst>
   </p:cSld>

</xml_diff>